<commit_message>
Dissertation presentation and poster
Dissertation presentation and poster
</commit_message>
<xml_diff>
--- a/Dissertation27:Aug/Presentation Diss.pptx
+++ b/Dissertation27:Aug/Presentation Diss.pptx
@@ -2072,7 +2072,7 @@
   <dgm:whole/>
   <dgm:extLst>
     <a:ext uri="http://schemas.microsoft.com/office/drawing/2008/diagram">
-      <dsp:dataModelExt xmlns:dsp="http://schemas.microsoft.com/office/drawing/2008/diagram" relId="rId7" minVer="http://schemas.openxmlformats.org/drawingml/2006/diagram"/>
+      <dsp:dataModelExt xmlns:dsp="http://schemas.microsoft.com/office/drawing/2008/diagram" relId="rId8" minVer="http://schemas.openxmlformats.org/drawingml/2006/diagram"/>
     </a:ext>
   </dgm:extLst>
 </dgm:dataModel>
@@ -10655,7 +10655,7 @@
         </p:nvSpPr>
         <p:spPr>
           <a:xfrm>
-            <a:off x="0" y="0"/>
+            <a:off x="0" y="38100"/>
             <a:ext cx="12192000" cy="6858000"/>
           </a:xfrm>
           <a:prstGeom prst="rect">
@@ -10724,26 +10724,21 @@
           </a:bodyPr>
           <a:lstStyle/>
           <a:p>
-            <a:pPr marL="0" lvl="0" indent="0" algn="ctr" rtl="0">
+            <a:pPr lvl="0">
               <a:lnSpc>
                 <a:spcPct val="88000"/>
               </a:lnSpc>
               <a:spcBef>
                 <a:spcPts val="0"/>
               </a:spcBef>
-              <a:spcAft>
-                <a:spcPts val="0"/>
-              </a:spcAft>
               <a:buClr>
                 <a:schemeClr val="lt1"/>
               </a:buClr>
               <a:buSzPct val="100000"/>
-              <a:buFont typeface="Arial"/>
-              <a:buNone/>
             </a:pPr>
             <a:r>
               <a:rPr lang="en-US" b="1" dirty="0"/>
-              <a:t>PREDICTING FIBRE CLASSIFICATION FOR MITOCHONRIOAL DISEASE DATASETS USING CLUSTERING TECHNIQUES </a:t>
+              <a:t>CLASSIFICATION OF FIBRES FROM THE  MITOCHONRIOAL DISEASE DATASET USING CLUSTERING TECHNIQUES </a:t>
             </a:r>
             <a:br>
               <a:rPr lang="en-US" dirty="0"/>
@@ -10781,7 +10776,7 @@
         </p:spPr>
         <p:txBody>
           <a:bodyPr spcFirstLastPara="1" wrap="square" lIns="0" tIns="0" rIns="0" bIns="0" anchor="b" anchorCtr="0">
-            <a:normAutofit fontScale="60000" lnSpcReduction="20000"/>
+            <a:normAutofit fontScale="90000"/>
           </a:bodyPr>
           <a:lstStyle>
             <a:defPPr marR="0" lvl="0" algn="l" rtl="0">
@@ -11039,7 +11034,7 @@
                 <a:latin typeface="Apple Chancery" panose="03020702040506060504" pitchFamily="66" charset="-79"/>
                 <a:cs typeface="Apple Chancery" panose="03020702040506060504" pitchFamily="66" charset="-79"/>
               </a:rPr>
-              <a:t>MSc Data Science Project and dissertation 2020/21 </a:t>
+              <a:t>CSC8639 - MSc Data Science Project and dissertation 2020/21 </a:t>
             </a:r>
           </a:p>
           <a:p>
@@ -11053,45 +11048,6 @@
               </a:rPr>
               <a:t>by  Frestie Ngongo</a:t>
             </a:r>
-          </a:p>
-          <a:p>
-            <a:pPr>
-              <a:buSzPct val="100000"/>
-            </a:pPr>
-            <a:endParaRPr lang="en-US" sz="2400" dirty="0">
-              <a:latin typeface="Apple Chancery" panose="03020702040506060504" pitchFamily="66" charset="-79"/>
-              <a:cs typeface="Apple Chancery" panose="03020702040506060504" pitchFamily="66" charset="-79"/>
-            </a:endParaRPr>
-          </a:p>
-          <a:p>
-            <a:pPr>
-              <a:buSzPct val="100000"/>
-            </a:pPr>
-            <a:r>
-              <a:rPr lang="en-US" sz="2400" dirty="0" err="1">
-                <a:latin typeface="Apple Chancery" panose="03020702040506060504" pitchFamily="66" charset="-79"/>
-                <a:cs typeface="Apple Chancery" panose="03020702040506060504" pitchFamily="66" charset="-79"/>
-              </a:rPr>
-              <a:t>Classification_of_fibres</a:t>
-            </a:r>
-            <a:r>
-              <a:rPr lang="en-US" sz="2400" dirty="0">
-                <a:latin typeface="Apple Chancery" panose="03020702040506060504" pitchFamily="66" charset="-79"/>
-                <a:cs typeface="Apple Chancery" panose="03020702040506060504" pitchFamily="66" charset="-79"/>
-              </a:rPr>
-              <a:t> from the </a:t>
-            </a:r>
-            <a:r>
-              <a:rPr lang="en-US" sz="2400" dirty="0" err="1">
-                <a:latin typeface="Apple Chancery" panose="03020702040506060504" pitchFamily="66" charset="-79"/>
-                <a:cs typeface="Apple Chancery" panose="03020702040506060504" pitchFamily="66" charset="-79"/>
-              </a:rPr>
-              <a:t>mitochondrial_disease_dataset_using_Clustering_techniques</a:t>
-            </a:r>
-            <a:endParaRPr lang="en-US" sz="2400" dirty="0">
-              <a:latin typeface="Apple Chancery" panose="03020702040506060504" pitchFamily="66" charset="-79"/>
-              <a:cs typeface="Apple Chancery" panose="03020702040506060504" pitchFamily="66" charset="-79"/>
-            </a:endParaRPr>
           </a:p>
         </p:txBody>
       </p:sp>
@@ -20958,7 +20914,9 @@
       </p:sp>
       <p:sp>
         <p:nvSpPr>
-          <p:cNvPr id="139" name="Google Shape;139;p6"/>
+          <p:cNvPr id="139" name="Google Shape;139;p6">
+            <a:hlinkClick r:id="rId3" tooltip="GitHub"/>
+          </p:cNvPr>
           <p:cNvSpPr/>
           <p:nvPr/>
         </p:nvSpPr>
@@ -21056,7 +21014,7 @@
         <p:spPr>
           <a:xfrm>
             <a:off x="424861" y="1435100"/>
-            <a:ext cx="6622913" cy="4803700"/>
+            <a:ext cx="6622913" cy="4330700"/>
           </a:xfrm>
           <a:prstGeom prst="rect">
             <a:avLst/>
@@ -21218,7 +21176,7 @@
         </p:xfrm>
         <a:graphic>
           <a:graphicData uri="http://schemas.openxmlformats.org/drawingml/2006/diagram">
-            <dgm:relIds xmlns:dgm="http://schemas.openxmlformats.org/drawingml/2006/diagram" xmlns:r="http://schemas.openxmlformats.org/officeDocument/2006/relationships" r:dm="rId3" r:lo="rId4" r:qs="rId5" r:cs="rId6"/>
+            <dgm:relIds xmlns:dgm="http://schemas.openxmlformats.org/drawingml/2006/diagram" xmlns:r="http://schemas.openxmlformats.org/officeDocument/2006/relationships" r:dm="rId4" r:lo="rId5" r:qs="rId6" r:cs="rId7"/>
           </a:graphicData>
         </a:graphic>
       </p:graphicFrame>
@@ -21235,7 +21193,7 @@
           <p:nvPr/>
         </p:nvPicPr>
         <p:blipFill rotWithShape="1">
-          <a:blip r:embed="rId8">
+          <a:blip r:embed="rId9">
             <a:alphaModFix/>
           </a:blip>
           <a:srcRect/>
@@ -21268,7 +21226,7 @@
           <p:nvPr/>
         </p:nvPicPr>
         <p:blipFill rotWithShape="1">
-          <a:blip r:embed="rId9">
+          <a:blip r:embed="rId10">
             <a:alphaModFix/>
           </a:blip>
           <a:srcRect/>
@@ -21288,6 +21246,57 @@
           </a:ln>
         </p:spPr>
       </p:pic>
+      <p:sp>
+        <p:nvSpPr>
+          <p:cNvPr id="3" name="TextBox 2">
+            <a:extLst>
+              <a:ext uri="{FF2B5EF4-FFF2-40B4-BE49-F238E27FC236}">
+                <a16:creationId xmlns:a16="http://schemas.microsoft.com/office/drawing/2014/main" id="{90DFE8AC-2992-E644-BAC9-D9F94CB6C937}"/>
+              </a:ext>
+            </a:extLst>
+          </p:cNvPr>
+          <p:cNvSpPr txBox="1"/>
+          <p:nvPr/>
+        </p:nvSpPr>
+        <p:spPr>
+          <a:xfrm>
+            <a:off x="3459580" y="5765800"/>
+            <a:ext cx="896522" cy="369332"/>
+          </a:xfrm>
+          <a:prstGeom prst="rect">
+            <a:avLst/>
+          </a:prstGeom>
+          <a:noFill/>
+        </p:spPr>
+        <p:txBody>
+          <a:bodyPr wrap="square" rtlCol="0">
+            <a:spAutoFit/>
+          </a:bodyPr>
+          <a:lstStyle/>
+          <a:p>
+            <a:r>
+              <a:rPr lang="en-US" dirty="0">
+                <a:solidFill>
+                  <a:schemeClr val="bg1"/>
+                </a:solidFill>
+                <a:hlinkClick r:id="rId3">
+                  <a:extLst>
+                    <a:ext uri="{A12FA001-AC4F-418D-AE19-62706E023703}">
+                      <ahyp:hlinkClr xmlns:ahyp="http://schemas.microsoft.com/office/drawing/2018/hyperlinkcolor" val="tx"/>
+                    </a:ext>
+                  </a:extLst>
+                </a:hlinkClick>
+              </a:rPr>
+              <a:t>GitHub</a:t>
+            </a:r>
+            <a:endParaRPr lang="en-US" dirty="0">
+              <a:solidFill>
+                <a:schemeClr val="bg1"/>
+              </a:solidFill>
+            </a:endParaRPr>
+          </a:p>
+        </p:txBody>
+      </p:sp>
     </p:spTree>
   </p:cSld>
   <p:clrMapOvr>

</xml_diff>